<commit_message>
Uppdaterat PPT med Profiler på slide 2
</commit_message>
<xml_diff>
--- a/docs/Slutredovisning_grp5_v9.pptx
+++ b/docs/Slutredovisning_grp5_v9.pptx
@@ -17879,6 +17879,17 @@
             <a:r>
               <a:rPr lang="sv-SE" dirty="0" err="1"/>
               <a:t>IntelliJ</a:t>
+            </a:r>
+            <a:endParaRPr lang="sv-SE" dirty="0"/>
+          </a:p>
+          <a:p>
+            <a:r>
+              <a:rPr lang="sv-SE" dirty="0" err="1"/>
+              <a:t>Netbeans</a:t>
+            </a:r>
+            <a:r>
+              <a:rPr lang="sv-SE"/>
+              <a:t> Profiler</a:t>
             </a:r>
             <a:endParaRPr lang="sv-SE" dirty="0"/>
           </a:p>

</xml_diff>

<commit_message>
Uppdaterat PPT med tillståndsmaskinstext
</commit_message>
<xml_diff>
--- a/docs/Slutredovisning_grp5_v9.pptx
+++ b/docs/Slutredovisning_grp5_v9.pptx
@@ -18349,71 +18349,35 @@
           <a:p>
             <a:r>
               <a:rPr lang="sv-SE" dirty="0"/>
-              <a:t>Motivering: Vi använde </a:t>
+              <a:t>Equipment variablerna på Hero</a:t>
+            </a:r>
+          </a:p>
+          <a:p>
+            <a:r>
+              <a:rPr lang="sv-SE" dirty="0"/>
+              <a:t>Vapen och </a:t>
             </a:r>
             <a:r>
               <a:rPr lang="sv-SE" dirty="0" err="1"/>
-              <a:t>equipmentsystemet</a:t>
+              <a:t>Armor</a:t>
             </a:r>
             <a:r>
               <a:rPr lang="sv-SE" dirty="0"/>
-              <a:t> för Hero till vår tillståndsmaskin då de </a:t>
+              <a:t> kan vara tilldelat eller </a:t>
             </a:r>
             <a:r>
               <a:rPr lang="sv-SE" dirty="0" err="1"/>
-              <a:t>equippade</a:t>
+              <a:t>null</a:t>
             </a:r>
             <a:r>
               <a:rPr lang="sv-SE" dirty="0"/>
-              <a:t> delarna kan ha olika status (</a:t>
-            </a:r>
-            <a:r>
-              <a:rPr lang="sv-SE" dirty="0" err="1"/>
-              <a:t>Equippat</a:t>
-            </a:r>
+              <a:t>, skiljt från varandra, ger 4 olika tillstånd (nästkommande bild).</a:t>
+            </a:r>
+          </a:p>
+          <a:p>
             <a:r>
               <a:rPr lang="sv-SE" dirty="0"/>
-              <a:t>/Tomt vapen, </a:t>
-            </a:r>
-            <a:r>
-              <a:rPr lang="sv-SE" dirty="0" err="1"/>
-              <a:t>Equippat</a:t>
-            </a:r>
-            <a:r>
-              <a:rPr lang="sv-SE" dirty="0"/>
-              <a:t>/Tomt </a:t>
-            </a:r>
-            <a:r>
-              <a:rPr lang="sv-SE" dirty="0" err="1"/>
-              <a:t>armor</a:t>
-            </a:r>
-            <a:r>
-              <a:rPr lang="sv-SE" dirty="0"/>
-              <a:t>) och för att man kan komma till de olika tillstånden på olika sätt eftersom det aktuella </a:t>
-            </a:r>
-            <a:r>
-              <a:rPr lang="sv-SE" dirty="0" err="1"/>
-              <a:t>itemet</a:t>
-            </a:r>
-            <a:r>
-              <a:rPr lang="sv-SE" dirty="0"/>
-              <a:t> endast byts ut om ett nytt item är starkare. På detta sätt kan vi prova olika sekvenser för att plocka upp </a:t>
-            </a:r>
-            <a:r>
-              <a:rPr lang="sv-SE" dirty="0" err="1"/>
-              <a:t>items</a:t>
-            </a:r>
-            <a:r>
-              <a:rPr lang="sv-SE" dirty="0"/>
-              <a:t> för att se att den </a:t>
-            </a:r>
-            <a:r>
-              <a:rPr lang="sv-SE" dirty="0" err="1"/>
-              <a:t>equippade</a:t>
-            </a:r>
-            <a:r>
-              <a:rPr lang="sv-SE" dirty="0"/>
-              <a:t> delen är korrekt.</a:t>
+              <a:t> 12 bågar då olika beteenden finns när man plockar upp ett item som är svagare eller starkare.</a:t>
             </a:r>
           </a:p>
         </p:txBody>

</xml_diff>